<commit_message>
Update gitbook 2021-08-26 18:08:55
</commit_message>
<xml_diff>
--- a/Session2HtmlIntro/HelloHtml.pptx
+++ b/Session2HtmlIntro/HelloHtml.pptx
@@ -219,7 +219,7 @@
           <a:p>
             <a:fld id="{19104133-B5B0-4351-8158-4F0E5EB1E2BF}" type="datetimeFigureOut">
               <a:rPr lang="en-US" smtClean="0"/>
-              <a:t>8/23/2021</a:t>
+              <a:t>8/26/2021</a:t>
             </a:fld>
             <a:endParaRPr lang="en-US"/>
           </a:p>
@@ -1471,7 +1471,7 @@
             <a:fld id="{1C2D31DE-C454-491C-B5C3-F097855E3DF7}" type="datetime4">
               <a:rPr lang="en-US" smtClean="0"/>
               <a:pPr/>
-              <a:t>August 23, 2021</a:t>
+              <a:t>August 26, 2021</a:t>
             </a:fld>
             <a:endParaRPr lang="en-US" dirty="0"/>
           </a:p>
@@ -4863,7 +4863,7 @@
           <a:p>
             <a:fld id="{5958763E-B898-436D-883D-03711491D54A}" type="datetimeFigureOut">
               <a:rPr lang="en-US" smtClean="0"/>
-              <a:t>8/23/2021</a:t>
+              <a:t>8/26/2021</a:t>
             </a:fld>
             <a:endParaRPr lang="en-US"/>
           </a:p>
@@ -5056,7 +5056,7 @@
           <a:p>
             <a:fld id="{5958763E-B898-436D-883D-03711491D54A}" type="datetimeFigureOut">
               <a:rPr lang="en-US" smtClean="0"/>
-              <a:t>8/23/2021</a:t>
+              <a:t>8/26/2021</a:t>
             </a:fld>
             <a:endParaRPr lang="en-US"/>
           </a:p>
@@ -5306,7 +5306,7 @@
           <a:p>
             <a:fld id="{5958763E-B898-436D-883D-03711491D54A}" type="datetimeFigureOut">
               <a:rPr lang="en-US" smtClean="0"/>
-              <a:t>8/23/2021</a:t>
+              <a:t>8/26/2021</a:t>
             </a:fld>
             <a:endParaRPr lang="en-US"/>
           </a:p>
@@ -5654,7 +5654,7 @@
           <a:p>
             <a:fld id="{5958763E-B898-436D-883D-03711491D54A}" type="datetimeFigureOut">
               <a:rPr lang="en-US" smtClean="0"/>
-              <a:t>8/23/2021</a:t>
+              <a:t>8/26/2021</a:t>
             </a:fld>
             <a:endParaRPr lang="en-US"/>
           </a:p>
@@ -6070,7 +6070,7 @@
           <a:p>
             <a:fld id="{5958763E-B898-436D-883D-03711491D54A}" type="datetimeFigureOut">
               <a:rPr lang="en-US" smtClean="0"/>
-              <a:t>8/23/2021</a:t>
+              <a:t>8/26/2021</a:t>
             </a:fld>
             <a:endParaRPr lang="en-US"/>
           </a:p>
@@ -6571,7 +6571,7 @@
           <a:p>
             <a:fld id="{5958763E-B898-436D-883D-03711491D54A}" type="datetimeFigureOut">
               <a:rPr lang="en-US" smtClean="0"/>
-              <a:t>8/23/2021</a:t>
+              <a:t>8/26/2021</a:t>
             </a:fld>
             <a:endParaRPr lang="en-US"/>
           </a:p>
@@ -7022,7 +7022,7 @@
           <a:p>
             <a:fld id="{5958763E-B898-436D-883D-03711491D54A}" type="datetimeFigureOut">
               <a:rPr lang="en-US" smtClean="0"/>
-              <a:t>8/23/2021</a:t>
+              <a:t>8/26/2021</a:t>
             </a:fld>
             <a:endParaRPr lang="en-US"/>
           </a:p>
@@ -7633,7 +7633,7 @@
           <a:p>
             <a:fld id="{5958763E-B898-436D-883D-03711491D54A}" type="datetimeFigureOut">
               <a:rPr lang="en-US" smtClean="0"/>
-              <a:t>8/23/2021</a:t>
+              <a:t>8/26/2021</a:t>
             </a:fld>
             <a:endParaRPr lang="en-US"/>
           </a:p>
@@ -8404,7 +8404,7 @@
           <a:p>
             <a:fld id="{5958763E-B898-436D-883D-03711491D54A}" type="datetimeFigureOut">
               <a:rPr lang="en-US" smtClean="0"/>
-              <a:t>8/23/2021</a:t>
+              <a:t>8/26/2021</a:t>
             </a:fld>
             <a:endParaRPr lang="en-US"/>
           </a:p>
@@ -8508,7 +8508,7 @@
           <a:p>
             <a:fld id="{5958763E-B898-436D-883D-03711491D54A}" type="datetimeFigureOut">
               <a:rPr lang="en-US" smtClean="0"/>
-              <a:t>8/23/2021</a:t>
+              <a:t>8/26/2021</a:t>
             </a:fld>
             <a:endParaRPr lang="en-US"/>
           </a:p>
@@ -8835,7 +8835,7 @@
             <a:fld id="{1C2D31DE-C454-491C-B5C3-F097855E3DF7}" type="datetime4">
               <a:rPr lang="en-US" smtClean="0"/>
               <a:pPr/>
-              <a:t>August 23, 2021</a:t>
+              <a:t>August 26, 2021</a:t>
             </a:fld>
             <a:endParaRPr lang="en-US" dirty="0"/>
           </a:p>
@@ -11987,7 +11987,7 @@
           <a:p>
             <a:fld id="{5958763E-B898-436D-883D-03711491D54A}" type="datetimeFigureOut">
               <a:rPr lang="en-US" smtClean="0"/>
-              <a:t>8/23/2021</a:t>
+              <a:t>8/26/2021</a:t>
             </a:fld>
             <a:endParaRPr lang="en-US"/>
           </a:p>
@@ -12111,7 +12111,7 @@
           <a:p>
             <a:fld id="{5958763E-B898-436D-883D-03711491D54A}" type="datetimeFigureOut">
               <a:rPr lang="en-US" smtClean="0"/>
-              <a:t>8/23/2021</a:t>
+              <a:t>8/26/2021</a:t>
             </a:fld>
             <a:endParaRPr lang="en-US"/>
           </a:p>
@@ -12235,7 +12235,7 @@
           <a:p>
             <a:fld id="{5958763E-B898-436D-883D-03711491D54A}" type="datetimeFigureOut">
               <a:rPr lang="en-US" smtClean="0"/>
-              <a:t>8/23/2021</a:t>
+              <a:t>8/26/2021</a:t>
             </a:fld>
             <a:endParaRPr lang="en-US"/>
           </a:p>
@@ -12359,7 +12359,7 @@
           <a:p>
             <a:fld id="{5958763E-B898-436D-883D-03711491D54A}" type="datetimeFigureOut">
               <a:rPr lang="en-US" smtClean="0"/>
-              <a:t>8/23/2021</a:t>
+              <a:t>8/26/2021</a:t>
             </a:fld>
             <a:endParaRPr lang="en-US"/>
           </a:p>
@@ -12483,7 +12483,7 @@
           <a:p>
             <a:fld id="{5958763E-B898-436D-883D-03711491D54A}" type="datetimeFigureOut">
               <a:rPr lang="en-US" smtClean="0"/>
-              <a:t>8/23/2021</a:t>
+              <a:t>8/26/2021</a:t>
             </a:fld>
             <a:endParaRPr lang="en-US"/>
           </a:p>
@@ -12607,7 +12607,7 @@
           <a:p>
             <a:fld id="{5958763E-B898-436D-883D-03711491D54A}" type="datetimeFigureOut">
               <a:rPr lang="en-US" smtClean="0"/>
-              <a:t>8/23/2021</a:t>
+              <a:t>8/26/2021</a:t>
             </a:fld>
             <a:endParaRPr lang="en-US"/>
           </a:p>
@@ -12731,7 +12731,7 @@
           <a:p>
             <a:fld id="{5958763E-B898-436D-883D-03711491D54A}" type="datetimeFigureOut">
               <a:rPr lang="en-US" smtClean="0"/>
-              <a:t>8/23/2021</a:t>
+              <a:t>8/26/2021</a:t>
             </a:fld>
             <a:endParaRPr lang="en-US"/>
           </a:p>
@@ -12855,7 +12855,7 @@
           <a:p>
             <a:fld id="{5958763E-B898-436D-883D-03711491D54A}" type="datetimeFigureOut">
               <a:rPr lang="en-US" smtClean="0"/>
-              <a:t>8/23/2021</a:t>
+              <a:t>8/26/2021</a:t>
             </a:fld>
             <a:endParaRPr lang="en-US"/>
           </a:p>
@@ -12988,7 +12988,7 @@
           <a:p>
             <a:fld id="{5958763E-B898-436D-883D-03711491D54A}" type="datetimeFigureOut">
               <a:rPr lang="en-US" smtClean="0"/>
-              <a:t>8/23/2021</a:t>
+              <a:t>8/26/2021</a:t>
             </a:fld>
             <a:endParaRPr lang="en-US"/>
           </a:p>
@@ -16327,7 +16327,7 @@
             <a:fld id="{1C2D31DE-C454-491C-B5C3-F097855E3DF7}" type="datetime4">
               <a:rPr lang="en-US" smtClean="0"/>
               <a:pPr/>
-              <a:t>August 23, 2021</a:t>
+              <a:t>August 26, 2021</a:t>
             </a:fld>
             <a:endParaRPr lang="en-US" dirty="0"/>
           </a:p>
@@ -28563,7 +28563,7 @@
           <a:p>
             <a:fld id="{5958763E-B898-436D-883D-03711491D54A}" type="datetimeFigureOut">
               <a:rPr lang="en-US" smtClean="0"/>
-              <a:t>8/23/2021</a:t>
+              <a:t>8/26/2021</a:t>
             </a:fld>
             <a:endParaRPr lang="en-US"/>
           </a:p>
@@ -28965,7 +28965,7 @@
           <a:p>
             <a:fld id="{5958763E-B898-436D-883D-03711491D54A}" type="datetimeFigureOut">
               <a:rPr lang="en-US" smtClean="0"/>
-              <a:t>8/23/2021</a:t>
+              <a:t>8/26/2021</a:t>
             </a:fld>
             <a:endParaRPr lang="en-US"/>
           </a:p>
@@ -29259,7 +29259,7 @@
           <a:p>
             <a:fld id="{5958763E-B898-436D-883D-03711491D54A}" type="datetimeFigureOut">
               <a:rPr lang="en-US" smtClean="0"/>
-              <a:t>8/23/2021</a:t>
+              <a:t>8/26/2021</a:t>
             </a:fld>
             <a:endParaRPr lang="en-US"/>
           </a:p>
@@ -29460,7 +29460,7 @@
           <a:p>
             <a:fld id="{5958763E-B898-436D-883D-03711491D54A}" type="datetimeFigureOut">
               <a:rPr lang="en-US" smtClean="0"/>
-              <a:t>8/23/2021</a:t>
+              <a:t>8/26/2021</a:t>
             </a:fld>
             <a:endParaRPr lang="en-US"/>
           </a:p>
@@ -29721,7 +29721,7 @@
           <a:p>
             <a:fld id="{5958763E-B898-436D-883D-03711491D54A}" type="datetimeFigureOut">
               <a:rPr lang="en-US" smtClean="0"/>
-              <a:t>8/23/2021</a:t>
+              <a:t>8/26/2021</a:t>
             </a:fld>
             <a:endParaRPr lang="en-US"/>
           </a:p>
@@ -30229,7 +30229,7 @@
           <a:p>
             <a:fld id="{5958763E-B898-436D-883D-03711491D54A}" type="datetimeFigureOut">
               <a:rPr lang="en-US" smtClean="0"/>
-              <a:t>8/23/2021</a:t>
+              <a:t>8/26/2021</a:t>
             </a:fld>
             <a:endParaRPr lang="en-US"/>
           </a:p>
@@ -30708,7 +30708,7 @@
           <a:p>
             <a:fld id="{5958763E-B898-436D-883D-03711491D54A}" type="datetimeFigureOut">
               <a:rPr lang="en-US" smtClean="0"/>
-              <a:t>8/23/2021</a:t>
+              <a:t>8/26/2021</a:t>
             </a:fld>
             <a:endParaRPr lang="en-US"/>
           </a:p>
@@ -31527,7 +31527,7 @@
           <a:p>
             <a:fld id="{5958763E-B898-436D-883D-03711491D54A}" type="datetimeFigureOut">
               <a:rPr lang="en-US" smtClean="0"/>
-              <a:t>8/23/2021</a:t>
+              <a:t>8/26/2021</a:t>
             </a:fld>
             <a:endParaRPr lang="en-US"/>
           </a:p>
@@ -31728,7 +31728,7 @@
           <a:p>
             <a:fld id="{5958763E-B898-436D-883D-03711491D54A}" type="datetimeFigureOut">
               <a:rPr lang="en-US" smtClean="0"/>
-              <a:t>8/23/2021</a:t>
+              <a:t>8/26/2021</a:t>
             </a:fld>
             <a:endParaRPr lang="en-US"/>
           </a:p>
@@ -32063,7 +32063,7 @@
           <a:p>
             <a:fld id="{5958763E-B898-436D-883D-03711491D54A}" type="datetimeFigureOut">
               <a:rPr lang="en-US" smtClean="0"/>
-              <a:t>8/23/2021</a:t>
+              <a:t>8/26/2021</a:t>
             </a:fld>
             <a:endParaRPr lang="en-US"/>
           </a:p>
@@ -32293,7 +32293,7 @@
           <a:p>
             <a:fld id="{5958763E-B898-436D-883D-03711491D54A}" type="datetimeFigureOut">
               <a:rPr lang="en-US" smtClean="0"/>
-              <a:t>8/23/2021</a:t>
+              <a:t>8/26/2021</a:t>
             </a:fld>
             <a:endParaRPr lang="en-US"/>
           </a:p>
@@ -32537,7 +32537,7 @@
           <a:p>
             <a:fld id="{5958763E-B898-436D-883D-03711491D54A}" type="datetimeFigureOut">
               <a:rPr lang="en-US" smtClean="0"/>
-              <a:t>8/23/2021</a:t>
+              <a:t>8/26/2021</a:t>
             </a:fld>
             <a:endParaRPr lang="en-US"/>
           </a:p>
@@ -37198,6 +37198,59 @@
                                               <p:pRg st="1" end="1"/>
                                             </p:txEl>
                                           </p:spTgt>
+                                        </p:tgtEl>
+                                      </p:cBhvr>
+                                    </p:animEffect>
+                                  </p:childTnLst>
+                                </p:cTn>
+                              </p:par>
+                            </p:childTnLst>
+                          </p:cTn>
+                        </p:par>
+                      </p:childTnLst>
+                    </p:cTn>
+                  </p:par>
+                  <p:par>
+                    <p:cTn id="13" fill="hold">
+                      <p:stCondLst>
+                        <p:cond delay="indefinite"/>
+                      </p:stCondLst>
+                      <p:childTnLst>
+                        <p:par>
+                          <p:cTn id="14" fill="hold">
+                            <p:stCondLst>
+                              <p:cond delay="0"/>
+                            </p:stCondLst>
+                            <p:childTnLst>
+                              <p:par>
+                                <p:cTn id="15" presetID="10" presetClass="entr" presetSubtype="0" fill="hold" nodeType="clickEffect">
+                                  <p:stCondLst>
+                                    <p:cond delay="0"/>
+                                  </p:stCondLst>
+                                  <p:childTnLst>
+                                    <p:set>
+                                      <p:cBhvr>
+                                        <p:cTn id="16" dur="1" fill="hold">
+                                          <p:stCondLst>
+                                            <p:cond delay="0"/>
+                                          </p:stCondLst>
+                                        </p:cTn>
+                                        <p:tgtEl>
+                                          <p:spTgt spid="1026"/>
+                                        </p:tgtEl>
+                                        <p:attrNameLst>
+                                          <p:attrName>style.visibility</p:attrName>
+                                        </p:attrNameLst>
+                                      </p:cBhvr>
+                                      <p:to>
+                                        <p:strVal val="visible"/>
+                                      </p:to>
+                                    </p:set>
+                                    <p:animEffect transition="in" filter="fade">
+                                      <p:cBhvr>
+                                        <p:cTn id="17" dur="500"/>
+                                        <p:tgtEl>
+                                          <p:spTgt spid="1026"/>
                                         </p:tgtEl>
                                       </p:cBhvr>
                                     </p:animEffect>

</xml_diff>